<commit_message>
updated slides, modified readme
</commit_message>
<xml_diff>
--- a/Final Presentation.pptx
+++ b/Final Presentation.pptx
@@ -26,7 +26,7 @@
     <p:sldId id="276" r:id="rId17"/>
     <p:sldId id="277" r:id="rId18"/>
     <p:sldId id="278" r:id="rId19"/>
-    <p:sldId id="281" r:id="rId20"/>
+    <p:sldId id="284" r:id="rId20"/>
     <p:sldId id="262" r:id="rId21"/>
     <p:sldId id="282" r:id="rId22"/>
     <p:sldId id="283" r:id="rId23"/>
@@ -218,7 +218,7 @@
           <a:p>
             <a:fld id="{31DDAA07-7814-4C2C-9CA6-5960F1E0BA91}" type="datetimeFigureOut">
               <a:rPr lang="en-AU" smtClean="0"/>
-              <a:t>11/04/2024</a:t>
+              <a:t>14/04/2024</a:t>
             </a:fld>
             <a:endParaRPr lang="en-AU"/>
           </a:p>
@@ -549,11 +549,14 @@
                 <a:effectLst/>
                 <a:latin typeface="-apple-system"/>
               </a:rPr>
-              <a:t> Tech workers experience precarious employment, unpredictable working hours, sedentary, and often socially isolating working conditions. Research on psychosocial working conditions suggests that these factors are likely to have significant impacts on workers' mental and physical health. Increasingly, research is suggesting that workplace cultures that encourage workers to disclose their mental health issues to colleagues and supervisors may improve the likelihood that workers will disclose mental health conditions, leading to better long-term outcomes for tech workers.</a:t>
-            </a:r>
-          </a:p>
-          <a:p>
-            <a:pPr algn="l"/>
+              <a:t> </a:t>
+            </a:r>
+          </a:p>
+          <a:p>
+            <a:pPr marL="171450" indent="-171450" algn="l">
+              <a:buFontTx/>
+              <a:buChar char="-"/>
+            </a:pPr>
             <a:r>
               <a:rPr lang="en-AU" b="0" i="0" dirty="0">
                 <a:solidFill>
@@ -562,7 +565,91 @@
                 <a:effectLst/>
                 <a:latin typeface="-apple-system"/>
               </a:rPr>
-              <a:t>The aims of this project are therefore to explore the factors that impact on tech workers mental health over two observation periods, before the COVID-19 pandemic (2014) compared with during the COVID-19 pandemic (2020-2022).</a:t>
+              <a:t>Tech workers experience precarious employment, unpredictable working hours, sedentary, and often socially isolating working conditions. </a:t>
+            </a:r>
+          </a:p>
+          <a:p>
+            <a:pPr marL="0" indent="0" algn="l">
+              <a:buFontTx/>
+              <a:buNone/>
+            </a:pPr>
+            <a:endParaRPr lang="en-AU" b="0" i="0" dirty="0">
+              <a:solidFill>
+                <a:srgbClr val="1F2328"/>
+              </a:solidFill>
+              <a:effectLst/>
+              <a:latin typeface="-apple-system"/>
+            </a:endParaRPr>
+          </a:p>
+          <a:p>
+            <a:pPr marL="171450" indent="-171450" algn="l">
+              <a:buFontTx/>
+              <a:buChar char="-"/>
+            </a:pPr>
+            <a:r>
+              <a:rPr lang="en-AU" b="0" i="0" dirty="0">
+                <a:solidFill>
+                  <a:srgbClr val="1F2328"/>
+                </a:solidFill>
+                <a:effectLst/>
+                <a:latin typeface="-apple-system"/>
+              </a:rPr>
+              <a:t>Research on psychosocial working conditions suggests that these factors are likely to have significant impacts on workers' mental and physical health. </a:t>
+            </a:r>
+          </a:p>
+          <a:p>
+            <a:pPr marL="0" indent="0" algn="l">
+              <a:buFontTx/>
+              <a:buNone/>
+            </a:pPr>
+            <a:endParaRPr lang="en-AU" b="0" i="0" dirty="0">
+              <a:solidFill>
+                <a:srgbClr val="1F2328"/>
+              </a:solidFill>
+              <a:effectLst/>
+              <a:latin typeface="-apple-system"/>
+            </a:endParaRPr>
+          </a:p>
+          <a:p>
+            <a:pPr marL="171450" indent="-171450" algn="l">
+              <a:buFontTx/>
+              <a:buChar char="-"/>
+            </a:pPr>
+            <a:r>
+              <a:rPr lang="en-AU" b="0" i="0" dirty="0">
+                <a:solidFill>
+                  <a:srgbClr val="1F2328"/>
+                </a:solidFill>
+                <a:effectLst/>
+                <a:latin typeface="-apple-system"/>
+              </a:rPr>
+              <a:t>Increasingly, research is suggesting that workplace cultures that encourage workers to disclose their mental health issues to colleagues and supervisors may improve the likelihood that workers will disclose mental health conditions, leading to better long-term outcomes for tech workers.</a:t>
+            </a:r>
+          </a:p>
+          <a:p>
+            <a:pPr marL="171450" indent="-171450" algn="l">
+              <a:buFontTx/>
+              <a:buChar char="-"/>
+            </a:pPr>
+            <a:endParaRPr lang="en-AU" b="0" i="0" dirty="0">
+              <a:solidFill>
+                <a:srgbClr val="1F2328"/>
+              </a:solidFill>
+              <a:effectLst/>
+              <a:latin typeface="-apple-system"/>
+            </a:endParaRPr>
+          </a:p>
+          <a:p>
+            <a:pPr algn="l"/>
+            <a:r>
+              <a:rPr lang="en-AU" b="0" i="0" dirty="0">
+                <a:solidFill>
+                  <a:srgbClr val="1F2328"/>
+                </a:solidFill>
+                <a:effectLst/>
+                <a:latin typeface="-apple-system"/>
+              </a:rPr>
+              <a:t>-  The aims of this project are therefore to explore the factors that impact on tech workers mental health over two observation periods, before the COVID-19 pandemic (2014) compared with during the COVID-19 pandemic (2020-2022).</a:t>
             </a:r>
           </a:p>
           <a:p>
@@ -669,7 +756,15 @@
             </a:pPr>
             <a:r>
               <a:rPr lang="en-AU" dirty="0"/>
-              <a:t>Mental health issues more prevalent in office-based workers pre-covid, this result is unexpected.</a:t>
+              <a:t>Mental health issues more prevalent in office-based workers pre-covid, this result is unexpected. Only one </a:t>
+            </a:r>
+            <a:r>
+              <a:rPr lang="en-AU" dirty="0" err="1"/>
+              <a:t>datasource</a:t>
+            </a:r>
+            <a:r>
+              <a:rPr lang="en-AU" dirty="0"/>
+              <a:t> (2014) for this analysis which I will expand on further in the limitations section. </a:t>
             </a:r>
           </a:p>
           <a:p>
@@ -779,7 +874,15 @@
             </a:pPr>
             <a:r>
               <a:rPr lang="en-AU" dirty="0"/>
-              <a:t>Results show that the pandemic didn’t really impact the percentage of tech workers with mental health issues where there was a family history of mental health issues. Also unexpected.</a:t>
+              <a:t>Results show that the </a:t>
+            </a:r>
+            <a:r>
+              <a:rPr lang="en-AU" b="1" dirty="0"/>
+              <a:t>pandemic didn’t really impact the percentage of tech workers with mental health issues where there was a family history of mental health issues</a:t>
+            </a:r>
+            <a:r>
+              <a:rPr lang="en-AU" dirty="0"/>
+              <a:t>. Also unexpected. Unable to complete Chi2 due to the different degrees of freedom.</a:t>
             </a:r>
           </a:p>
           <a:p>
@@ -886,7 +989,15 @@
             </a:pPr>
             <a:r>
               <a:rPr lang="en-AU" dirty="0"/>
-              <a:t>No change, despite the counts in the </a:t>
+              <a:t>James : </a:t>
+            </a:r>
+            <a:r>
+              <a:rPr lang="en-AU" b="1" dirty="0"/>
+              <a:t>No change</a:t>
+            </a:r>
+            <a:r>
+              <a:rPr lang="en-AU" dirty="0"/>
+              <a:t>, despite the counts in the </a:t>
             </a:r>
             <a:r>
               <a:rPr lang="en-AU" dirty="0" err="1"/>
@@ -894,15 +1005,7 @@
             </a:r>
             <a:r>
               <a:rPr lang="en-AU" dirty="0"/>
-              <a:t> being completely different. (we didn’t just replicate the same graph ;). How to show value counts in pie chart – </a:t>
-            </a:r>
-            <a:r>
-              <a:rPr lang="en-AU" dirty="0" err="1"/>
-              <a:t>Siyuan</a:t>
-            </a:r>
-            <a:r>
-              <a:rPr lang="en-AU" dirty="0"/>
-              <a:t> or Chris</a:t>
+              <a:t> being completely different. We didn’t just duplicate the graphs we swear…</a:t>
             </a:r>
           </a:p>
           <a:p>
@@ -1009,8 +1112,13 @@
             </a:pPr>
             <a:r>
               <a:rPr lang="en-AU" dirty="0"/>
-              <a:t>Increase in percentage of employees willing to talk to co-workers, however from previous slide, no change in willingness to disclose to supervisors. </a:t>
-            </a:r>
+              <a:t>James : </a:t>
+            </a:r>
+            <a:r>
+              <a:rPr lang="en-AU" b="1" dirty="0"/>
+              <a:t>Increase in percentage of employees willing to talk to co-workers by 16.8%, mental health discussion seems much more open post pandemic.</a:t>
+            </a:r>
+            <a:endParaRPr lang="en-AU" dirty="0"/>
           </a:p>
           <a:p>
             <a:endParaRPr lang="en-AU" dirty="0"/>
@@ -1127,7 +1235,7 @@
     </p:spTree>
     <p:extLst>
       <p:ext uri="{BB962C8B-B14F-4D97-AF65-F5344CB8AC3E}">
-        <p14:creationId xmlns:p14="http://schemas.microsoft.com/office/powerpoint/2010/main" val="3263907648"/>
+        <p14:creationId xmlns:p14="http://schemas.microsoft.com/office/powerpoint/2010/main" val="2770499691"/>
       </p:ext>
     </p:extLst>
   </p:cSld>
@@ -1181,6 +1289,93 @@
           <a:bodyPr/>
           <a:lstStyle/>
           <a:p>
+            <a:r>
+              <a:rPr lang="en-AU" dirty="0"/>
+              <a:t>Katrina: Conclusions, James – Limitations?</a:t>
+            </a:r>
+          </a:p>
+        </p:txBody>
+      </p:sp>
+      <p:sp>
+        <p:nvSpPr>
+          <p:cNvPr id="4" name="Slide Number Placeholder 3"/>
+          <p:cNvSpPr>
+            <a:spLocks noGrp="1"/>
+          </p:cNvSpPr>
+          <p:nvPr>
+            <p:ph type="sldNum" sz="quarter" idx="5"/>
+          </p:nvPr>
+        </p:nvSpPr>
+        <p:spPr/>
+        <p:txBody>
+          <a:bodyPr/>
+          <a:lstStyle/>
+          <a:p>
+            <a:fld id="{650A4150-C3AC-4031-8BA0-2A154E986986}" type="slidenum">
+              <a:rPr lang="en-AU" smtClean="0"/>
+              <a:t>20</a:t>
+            </a:fld>
+            <a:endParaRPr lang="en-AU"/>
+          </a:p>
+        </p:txBody>
+      </p:sp>
+    </p:spTree>
+    <p:extLst>
+      <p:ext uri="{BB962C8B-B14F-4D97-AF65-F5344CB8AC3E}">
+        <p14:creationId xmlns:p14="http://schemas.microsoft.com/office/powerpoint/2010/main" val="1837285347"/>
+      </p:ext>
+    </p:extLst>
+  </p:cSld>
+  <p:clrMapOvr>
+    <a:masterClrMapping/>
+  </p:clrMapOvr>
+</p:notes>
+</file>
+
+<file path=ppt/notesSlides/notesSlide16.xml><?xml version="1.0" encoding="utf-8"?>
+<p:notes xmlns:a="http://schemas.openxmlformats.org/drawingml/2006/main" xmlns:r="http://schemas.openxmlformats.org/officeDocument/2006/relationships" xmlns:p="http://schemas.openxmlformats.org/presentationml/2006/main">
+  <p:cSld>
+    <p:spTree>
+      <p:nvGrpSpPr>
+        <p:cNvPr id="1" name=""/>
+        <p:cNvGrpSpPr/>
+        <p:nvPr/>
+      </p:nvGrpSpPr>
+      <p:grpSpPr>
+        <a:xfrm>
+          <a:off x="0" y="0"/>
+          <a:ext cx="0" cy="0"/>
+          <a:chOff x="0" y="0"/>
+          <a:chExt cx="0" cy="0"/>
+        </a:xfrm>
+      </p:grpSpPr>
+      <p:sp>
+        <p:nvSpPr>
+          <p:cNvPr id="2" name="Slide Image Placeholder 1"/>
+          <p:cNvSpPr>
+            <a:spLocks noGrp="1" noRot="1" noChangeAspect="1"/>
+          </p:cNvSpPr>
+          <p:nvPr>
+            <p:ph type="sldImg"/>
+          </p:nvPr>
+        </p:nvSpPr>
+        <p:spPr/>
+      </p:sp>
+      <p:sp>
+        <p:nvSpPr>
+          <p:cNvPr id="3" name="Notes Placeholder 2"/>
+          <p:cNvSpPr>
+            <a:spLocks noGrp="1"/>
+          </p:cNvSpPr>
+          <p:nvPr>
+            <p:ph type="body" idx="1"/>
+          </p:nvPr>
+        </p:nvSpPr>
+        <p:spPr/>
+        <p:txBody>
+          <a:bodyPr/>
+          <a:lstStyle/>
+          <a:p>
             <a:endParaRPr lang="en-AU" dirty="0"/>
           </a:p>
         </p:txBody>
@@ -1212,6 +1407,94 @@
     <p:extLst>
       <p:ext uri="{BB962C8B-B14F-4D97-AF65-F5344CB8AC3E}">
         <p14:creationId xmlns:p14="http://schemas.microsoft.com/office/powerpoint/2010/main" val="642504923"/>
+      </p:ext>
+    </p:extLst>
+  </p:cSld>
+  <p:clrMapOvr>
+    <a:masterClrMapping/>
+  </p:clrMapOvr>
+</p:notes>
+</file>
+
+<file path=ppt/notesSlides/notesSlide17.xml><?xml version="1.0" encoding="utf-8"?>
+<p:notes xmlns:a="http://schemas.openxmlformats.org/drawingml/2006/main" xmlns:r="http://schemas.openxmlformats.org/officeDocument/2006/relationships" xmlns:p="http://schemas.openxmlformats.org/presentationml/2006/main">
+  <p:cSld>
+    <p:spTree>
+      <p:nvGrpSpPr>
+        <p:cNvPr id="1" name=""/>
+        <p:cNvGrpSpPr/>
+        <p:nvPr/>
+      </p:nvGrpSpPr>
+      <p:grpSpPr>
+        <a:xfrm>
+          <a:off x="0" y="0"/>
+          <a:ext cx="0" cy="0"/>
+          <a:chOff x="0" y="0"/>
+          <a:chExt cx="0" cy="0"/>
+        </a:xfrm>
+      </p:grpSpPr>
+      <p:sp>
+        <p:nvSpPr>
+          <p:cNvPr id="2" name="Slide Image Placeholder 1"/>
+          <p:cNvSpPr>
+            <a:spLocks noGrp="1" noRot="1" noChangeAspect="1"/>
+          </p:cNvSpPr>
+          <p:nvPr>
+            <p:ph type="sldImg"/>
+          </p:nvPr>
+        </p:nvSpPr>
+        <p:spPr/>
+      </p:sp>
+      <p:sp>
+        <p:nvSpPr>
+          <p:cNvPr id="3" name="Notes Placeholder 2"/>
+          <p:cNvSpPr>
+            <a:spLocks noGrp="1"/>
+          </p:cNvSpPr>
+          <p:nvPr>
+            <p:ph type="body" idx="1"/>
+          </p:nvPr>
+        </p:nvSpPr>
+        <p:spPr/>
+        <p:txBody>
+          <a:bodyPr/>
+          <a:lstStyle/>
+          <a:p>
+            <a:r>
+              <a:rPr lang="en-AU"/>
+              <a:t>Joyce/Erin??</a:t>
+            </a:r>
+            <a:endParaRPr lang="en-AU" dirty="0"/>
+          </a:p>
+        </p:txBody>
+      </p:sp>
+      <p:sp>
+        <p:nvSpPr>
+          <p:cNvPr id="4" name="Slide Number Placeholder 3"/>
+          <p:cNvSpPr>
+            <a:spLocks noGrp="1"/>
+          </p:cNvSpPr>
+          <p:nvPr>
+            <p:ph type="sldNum" sz="quarter" idx="5"/>
+          </p:nvPr>
+        </p:nvSpPr>
+        <p:spPr/>
+        <p:txBody>
+          <a:bodyPr/>
+          <a:lstStyle/>
+          <a:p>
+            <a:fld id="{650A4150-C3AC-4031-8BA0-2A154E986986}" type="slidenum">
+              <a:rPr lang="en-AU" smtClean="0"/>
+              <a:t>22</a:t>
+            </a:fld>
+            <a:endParaRPr lang="en-AU"/>
+          </a:p>
+        </p:txBody>
+      </p:sp>
+    </p:spTree>
+    <p:extLst>
+      <p:ext uri="{BB962C8B-B14F-4D97-AF65-F5344CB8AC3E}">
+        <p14:creationId xmlns:p14="http://schemas.microsoft.com/office/powerpoint/2010/main" val="4062796141"/>
       </p:ext>
     </p:extLst>
   </p:cSld>
@@ -1269,9 +1552,50 @@
               <a:rPr lang="en-AU" b="1" dirty="0"/>
               <a:t>Joyce: </a:t>
             </a:r>
+          </a:p>
+          <a:p>
+            <a:pPr marL="171450" indent="-171450">
+              <a:buFontTx/>
+              <a:buChar char="-"/>
+            </a:pPr>
             <a:r>
               <a:rPr lang="en-AU" dirty="0"/>
-              <a:t>Our data was sourced from the example health data provided, whereby Tech Workers were interviewed and provided insights into their mental health status and the level of support they get from their current and previous employer, and how comfortable they feel discussing issues with peers and supervisors. Four data streams were used, 2014, 2020, 2021 &amp; 2022. This gave us the ability to compare surveys pre and post covid.</a:t>
+              <a:t>Our data was sourced from the example health data provided (.csv format) within the suggested material on </a:t>
+            </a:r>
+            <a:r>
+              <a:rPr lang="en-AU" dirty="0" err="1"/>
+              <a:t>Bootcampspot</a:t>
+            </a:r>
+            <a:endParaRPr lang="en-AU" dirty="0"/>
+          </a:p>
+          <a:p>
+            <a:pPr marL="171450" indent="-171450">
+              <a:buFontTx/>
+              <a:buChar char="-"/>
+            </a:pPr>
+            <a:r>
+              <a:rPr lang="en-AU" dirty="0"/>
+              <a:t>Tech Workers were interviewed and provided insights into their mental health status and the level of support they get from their current and previous employer, </a:t>
+            </a:r>
+          </a:p>
+          <a:p>
+            <a:pPr marL="171450" indent="-171450">
+              <a:buFontTx/>
+              <a:buChar char="-"/>
+            </a:pPr>
+            <a:r>
+              <a:rPr lang="en-AU" dirty="0"/>
+              <a:t>They identified how comfortable they feel discussing issues with peers and supervisors. </a:t>
+            </a:r>
+          </a:p>
+          <a:p>
+            <a:pPr marL="171450" indent="-171450">
+              <a:buFontTx/>
+              <a:buChar char="-"/>
+            </a:pPr>
+            <a:r>
+              <a:rPr lang="en-AU" dirty="0"/>
+              <a:t>Four data streams were used, 2014, 2020, 2021 &amp; 2022. This gave us the ability to compare surveys pre and post covid.</a:t>
             </a:r>
           </a:p>
         </p:txBody>
@@ -1583,7 +1907,7 @@
           <a:p>
             <a:r>
               <a:rPr lang="en-AU" dirty="0"/>
-              <a:t>James</a:t>
+              <a:t>James: Similar results between pre and post pandemic as shown by our Chi2 result which out p value is much larger than 0.05.</a:t>
             </a:r>
           </a:p>
         </p:txBody>
@@ -1757,7 +2081,31 @@
           <a:p>
             <a:r>
               <a:rPr lang="en-AU" dirty="0"/>
-              <a:t>James</a:t>
+              <a:t>James: This shows </a:t>
+            </a:r>
+            <a:r>
+              <a:rPr lang="en-AU" b="1" dirty="0"/>
+              <a:t>the count of self-reported mental health issues per country </a:t>
+            </a:r>
+            <a:r>
+              <a:rPr lang="en-AU" dirty="0"/>
+              <a:t>as tech workers. Clearly the </a:t>
+            </a:r>
+            <a:r>
+              <a:rPr lang="en-AU" b="1" dirty="0"/>
+              <a:t>US has the highest number of cases</a:t>
+            </a:r>
+            <a:r>
+              <a:rPr lang="en-AU" dirty="0"/>
+              <a:t>, this purely because the survey was </a:t>
+            </a:r>
+            <a:r>
+              <a:rPr lang="en-AU" b="1" dirty="0"/>
+              <a:t>more widely distributed in the US</a:t>
+            </a:r>
+            <a:r>
+              <a:rPr lang="en-AU" dirty="0"/>
+              <a:t>, however this is only an assumption</a:t>
             </a:r>
           </a:p>
         </p:txBody>
@@ -1844,7 +2192,23 @@
           <a:p>
             <a:r>
               <a:rPr lang="en-AU" dirty="0"/>
-              <a:t>James</a:t>
+              <a:t>James: </a:t>
+            </a:r>
+            <a:r>
+              <a:rPr lang="en-AU" b="1" dirty="0"/>
+              <a:t>Similar results as above</a:t>
+            </a:r>
+            <a:r>
+              <a:rPr lang="en-AU" dirty="0"/>
+              <a:t>, majority of survey results came from the US, </a:t>
+            </a:r>
+            <a:r>
+              <a:rPr lang="en-AU" b="1" dirty="0"/>
+              <a:t>noticeably, India jumped 8 places</a:t>
+            </a:r>
+            <a:r>
+              <a:rPr lang="en-AU" dirty="0"/>
+              <a:t>.</a:t>
             </a:r>
           </a:p>
         </p:txBody>
@@ -1948,7 +2312,7 @@
             </a:pPr>
             <a:r>
               <a:rPr lang="en-AU" dirty="0"/>
-              <a:t>Significant increase in tech companies that provide mental health wellness programs, a positive result from the pandemic and or a better recognition or understanding of mental health issues. Change %numbers, larger titles etc</a:t>
+              <a:t>James : Significant increase in tech companies that provide mental health wellness programs, this may be attributed to greater mental health awareness post pandemic, or greater communication between employers and employees. </a:t>
             </a:r>
           </a:p>
           <a:p>
@@ -2141,7 +2505,7 @@
           <a:p>
             <a:fld id="{C4596805-D2F7-4045-B3B7-6DC6BE4F5E9D}" type="datetimeFigureOut">
               <a:rPr lang="en-AU" smtClean="0"/>
-              <a:t>11/04/2024</a:t>
+              <a:t>14/04/2024</a:t>
             </a:fld>
             <a:endParaRPr lang="en-AU"/>
           </a:p>
@@ -2341,7 +2705,7 @@
           <a:p>
             <a:fld id="{C4596805-D2F7-4045-B3B7-6DC6BE4F5E9D}" type="datetimeFigureOut">
               <a:rPr lang="en-AU" smtClean="0"/>
-              <a:t>11/04/2024</a:t>
+              <a:t>14/04/2024</a:t>
             </a:fld>
             <a:endParaRPr lang="en-AU"/>
           </a:p>
@@ -2551,7 +2915,7 @@
           <a:p>
             <a:fld id="{C4596805-D2F7-4045-B3B7-6DC6BE4F5E9D}" type="datetimeFigureOut">
               <a:rPr lang="en-AU" smtClean="0"/>
-              <a:t>11/04/2024</a:t>
+              <a:t>14/04/2024</a:t>
             </a:fld>
             <a:endParaRPr lang="en-AU"/>
           </a:p>
@@ -2751,7 +3115,7 @@
           <a:p>
             <a:fld id="{C4596805-D2F7-4045-B3B7-6DC6BE4F5E9D}" type="datetimeFigureOut">
               <a:rPr lang="en-AU" smtClean="0"/>
-              <a:t>11/04/2024</a:t>
+              <a:t>14/04/2024</a:t>
             </a:fld>
             <a:endParaRPr lang="en-AU"/>
           </a:p>
@@ -3027,7 +3391,7 @@
           <a:p>
             <a:fld id="{C4596805-D2F7-4045-B3B7-6DC6BE4F5E9D}" type="datetimeFigureOut">
               <a:rPr lang="en-AU" smtClean="0"/>
-              <a:t>11/04/2024</a:t>
+              <a:t>14/04/2024</a:t>
             </a:fld>
             <a:endParaRPr lang="en-AU"/>
           </a:p>
@@ -3295,7 +3659,7 @@
           <a:p>
             <a:fld id="{C4596805-D2F7-4045-B3B7-6DC6BE4F5E9D}" type="datetimeFigureOut">
               <a:rPr lang="en-AU" smtClean="0"/>
-              <a:t>11/04/2024</a:t>
+              <a:t>14/04/2024</a:t>
             </a:fld>
             <a:endParaRPr lang="en-AU"/>
           </a:p>
@@ -3710,7 +4074,7 @@
           <a:p>
             <a:fld id="{C4596805-D2F7-4045-B3B7-6DC6BE4F5E9D}" type="datetimeFigureOut">
               <a:rPr lang="en-AU" smtClean="0"/>
-              <a:t>11/04/2024</a:t>
+              <a:t>14/04/2024</a:t>
             </a:fld>
             <a:endParaRPr lang="en-AU"/>
           </a:p>
@@ -3852,7 +4216,7 @@
           <a:p>
             <a:fld id="{C4596805-D2F7-4045-B3B7-6DC6BE4F5E9D}" type="datetimeFigureOut">
               <a:rPr lang="en-AU" smtClean="0"/>
-              <a:t>11/04/2024</a:t>
+              <a:t>14/04/2024</a:t>
             </a:fld>
             <a:endParaRPr lang="en-AU"/>
           </a:p>
@@ -3965,7 +4329,7 @@
           <a:p>
             <a:fld id="{C4596805-D2F7-4045-B3B7-6DC6BE4F5E9D}" type="datetimeFigureOut">
               <a:rPr lang="en-AU" smtClean="0"/>
-              <a:t>11/04/2024</a:t>
+              <a:t>14/04/2024</a:t>
             </a:fld>
             <a:endParaRPr lang="en-AU"/>
           </a:p>
@@ -4278,7 +4642,7 @@
           <a:p>
             <a:fld id="{C4596805-D2F7-4045-B3B7-6DC6BE4F5E9D}" type="datetimeFigureOut">
               <a:rPr lang="en-AU" smtClean="0"/>
-              <a:t>11/04/2024</a:t>
+              <a:t>14/04/2024</a:t>
             </a:fld>
             <a:endParaRPr lang="en-AU"/>
           </a:p>
@@ -4567,7 +4931,7 @@
           <a:p>
             <a:fld id="{C4596805-D2F7-4045-B3B7-6DC6BE4F5E9D}" type="datetimeFigureOut">
               <a:rPr lang="en-AU" smtClean="0"/>
-              <a:t>11/04/2024</a:t>
+              <a:t>14/04/2024</a:t>
             </a:fld>
             <a:endParaRPr lang="en-AU"/>
           </a:p>
@@ -4810,7 +5174,7 @@
           <a:p>
             <a:fld id="{C4596805-D2F7-4045-B3B7-6DC6BE4F5E9D}" type="datetimeFigureOut">
               <a:rPr lang="en-AU" smtClean="0"/>
-              <a:t>11/04/2024</a:t>
+              <a:t>14/04/2024</a:t>
             </a:fld>
             <a:endParaRPr lang="en-AU"/>
           </a:p>
@@ -7302,7 +7666,7 @@
         </p:nvSpPr>
         <p:spPr>
           <a:xfrm>
-            <a:off x="424716" y="2835753"/>
+            <a:off x="424716" y="2371520"/>
             <a:ext cx="4023360" cy="3204134"/>
           </a:xfrm>
         </p:spPr>
@@ -7320,7 +7684,7 @@
                 <a:effectLst/>
                 <a:latin typeface="-apple-system"/>
               </a:rPr>
-              <a:t>6. How likely are those with self-reported mental health conditions likely to disclose to supervisors verses co-workers?</a:t>
+              <a:t>6. How are those with self-reported mental health conditions likely to disclose issues to supervisors</a:t>
             </a:r>
             <a:br>
               <a:rPr lang="en-AU" sz="1100" b="0" i="0" dirty="0">
@@ -8018,7 +8382,7 @@
         </p:spPr>
         <p:txBody>
           <a:bodyPr vert="horz" lIns="91440" tIns="45720" rIns="91440" bIns="45720" rtlCol="0" anchor="b">
-            <a:normAutofit/>
+            <a:normAutofit fontScale="90000"/>
           </a:bodyPr>
           <a:lstStyle/>
           <a:p>
@@ -8031,7 +8395,7 @@
                 <a:effectLst/>
                 <a:latin typeface="-apple-system"/>
               </a:rPr>
-              <a:t>7. Has the impact of covid changed any of the above conditions.</a:t>
+              <a:t>7. How are those with self-reported mental health conditions likely to disclose issues to supervisors</a:t>
             </a:r>
           </a:p>
         </p:txBody>
@@ -8847,7 +9211,7 @@
     </p:spTree>
     <p:extLst>
       <p:ext uri="{BB962C8B-B14F-4D97-AF65-F5344CB8AC3E}">
-        <p14:creationId xmlns:p14="http://schemas.microsoft.com/office/powerpoint/2010/main" val="3446903451"/>
+        <p14:creationId xmlns:p14="http://schemas.microsoft.com/office/powerpoint/2010/main" val="2083521382"/>
       </p:ext>
     </p:extLst>
   </p:cSld>
@@ -9297,7 +9661,7 @@
         <p:spPr>
           <a:xfrm>
             <a:off x="621437" y="71022"/>
-            <a:ext cx="5157926" cy="6324808"/>
+            <a:ext cx="5157926" cy="6740307"/>
           </a:xfrm>
           <a:prstGeom prst="rect">
             <a:avLst/>
@@ -9329,7 +9693,6 @@
                   <a:srgbClr val="1D1C1D"/>
                 </a:solidFill>
                 <a:effectLst/>
-                <a:latin typeface="Slack-Lato"/>
               </a:rPr>
               <a:t> No significant increase in proportion of tech workers self-reporting MH issues post-COVID-19</a:t>
             </a:r>
@@ -9348,7 +9711,6 @@
                   <a:srgbClr val="1D1C1D"/>
                 </a:solidFill>
                 <a:effectLst/>
-                <a:latin typeface="Slack-Lato"/>
               </a:rPr>
               <a:t> More tech employees are offering MH wellness programs to employees post-COVID-19</a:t>
             </a:r>
@@ -9367,7 +9729,6 @@
                   <a:srgbClr val="1D1C1D"/>
                 </a:solidFill>
                 <a:effectLst/>
-                <a:latin typeface="Slack-Lato"/>
               </a:rPr>
               <a:t> Surprisingly, majority of tech workers reporting MH issues were office based (but we couldn't compare post-COVID-19 due to data unavailability)</a:t>
             </a:r>
@@ -9386,7 +9747,6 @@
                   <a:srgbClr val="1D1C1D"/>
                 </a:solidFill>
                 <a:effectLst/>
-                <a:latin typeface="Slack-Lato"/>
               </a:rPr>
               <a:t> Despite greater awareness and availability of MH programs, tech workers were no more comfortable in disclosing their issues to a supervisor pre- and post-COVID-19</a:t>
             </a:r>
@@ -9405,7 +9765,6 @@
                   <a:srgbClr val="1D1C1D"/>
                 </a:solidFill>
                 <a:effectLst/>
-                <a:latin typeface="Slack-Lato"/>
               </a:rPr>
               <a:t> However, willingness to disclose to a co-worker did significantly improve post-COVID-19</a:t>
             </a:r>
@@ -9433,7 +9792,7 @@
         <p:spPr>
           <a:xfrm>
             <a:off x="6002784" y="0"/>
-            <a:ext cx="5157926" cy="7432804"/>
+            <a:ext cx="5157926" cy="7848302"/>
           </a:xfrm>
           <a:prstGeom prst="rect">
             <a:avLst/>
@@ -9467,7 +9826,16 @@
                 <a:effectLst/>
                 <a:latin typeface="Slack-Lato"/>
               </a:rPr>
-              <a:t> Divergence in questions and response options employed in surveys before and after COVID, making it inappropriate to utilize the chi-square test for comparing distribution variance.</a:t>
+              <a:t> </a:t>
+            </a:r>
+            <a:r>
+              <a:rPr lang="en-AU" b="0" i="0" dirty="0">
+                <a:solidFill>
+                  <a:srgbClr val="1D1C1D"/>
+                </a:solidFill>
+                <a:effectLst/>
+              </a:rPr>
+              <a:t>Divergence in questions and response options employed in surveys before and after COVID, making it inappropriate to utilize the chi-square test for comparing distribution variance.</a:t>
             </a:r>
           </a:p>
           <a:p>
@@ -9482,9 +9850,8 @@
                   <a:srgbClr val="1D1C1D"/>
                 </a:solidFill>
                 <a:effectLst/>
-                <a:latin typeface="Slack-Lato"/>
               </a:rPr>
-              <a:t>2. The way mental health among tech workers is determined relies on whether they sought help from a medical professional. However, COVID-19-related restrictions on selective medical services might introduce bias against those genuinely experiencing mental health issues.</a:t>
+              <a:t>2. The way mental health among tech workers is determined, relies on whether they sought help from a medical professional. However, COVID-19-related restrictions on selective medical services might introduce bias against those genuinely experiencing mental health issues.</a:t>
             </a:r>
           </a:p>
           <a:p>
@@ -9498,7 +9865,6 @@
                 <a:solidFill>
                   <a:srgbClr val="1D1C1D"/>
                 </a:solidFill>
-                <a:latin typeface="Slack-Lato"/>
               </a:rPr>
               <a:t>3. </a:t>
             </a:r>
@@ -9508,7 +9874,6 @@
                   <a:srgbClr val="1D1C1D"/>
                 </a:solidFill>
                 <a:effectLst/>
-                <a:latin typeface="Slack-Lato"/>
               </a:rPr>
               <a:t>Majority of respondents from USA with very different healthcare model to, e.g., AUS</a:t>
             </a:r>
@@ -9524,7 +9889,6 @@
                 <a:solidFill>
                   <a:srgbClr val="1D1C1D"/>
                 </a:solidFill>
-                <a:latin typeface="Slack-Lato"/>
               </a:rPr>
               <a:t>4. </a:t>
             </a:r>
@@ -9534,7 +9898,6 @@
                   <a:srgbClr val="1D1C1D"/>
                 </a:solidFill>
                 <a:effectLst/>
-                <a:latin typeface="Slack-Lato"/>
               </a:rPr>
               <a:t>Changes may also reflect processes, such as greater awareness of programs and policy changes, rather than being wholly attributable to COVID-19</a:t>
             </a:r>
@@ -10122,8 +10485,8 @@
         </p:nvSpPr>
         <p:spPr>
           <a:xfrm>
-            <a:off x="2867487" y="1145219"/>
-            <a:ext cx="6622742" cy="5078313"/>
+            <a:off x="2825284" y="671691"/>
+            <a:ext cx="6622742" cy="6186309"/>
           </a:xfrm>
           <a:prstGeom prst="rect">
             <a:avLst/>
@@ -10152,14 +10515,20 @@
             </a:r>
           </a:p>
           <a:p>
+            <a:endParaRPr lang="en-AU" dirty="0"/>
+          </a:p>
+          <a:p>
             <a:pPr marL="285750" indent="-285750">
               <a:buFontTx/>
               <a:buChar char="-"/>
             </a:pPr>
             <a:r>
               <a:rPr lang="en-AU" dirty="0"/>
-              <a:t>Each specific columns were selected via filter which would answer our hypothesis questions. </a:t>
-            </a:r>
+              <a:t>Each specific columns were selected via filter which would answer our hypothesis questions.</a:t>
+            </a:r>
+          </a:p>
+          <a:p>
+            <a:endParaRPr lang="en-AU" dirty="0"/>
           </a:p>
           <a:p>
             <a:pPr marL="285750" indent="-285750">
@@ -10172,6 +10541,9 @@
             </a:r>
           </a:p>
           <a:p>
+            <a:endParaRPr lang="en-AU" dirty="0"/>
+          </a:p>
+          <a:p>
             <a:pPr marL="285750" indent="-285750">
               <a:buFontTx/>
               <a:buChar char="-"/>
@@ -10180,6 +10552,9 @@
               <a:rPr lang="en-AU" dirty="0"/>
               <a:t>2020 to 2022 was merged as these datasets were similar in structure and could be analysed as one dataset. This merged dataset had initially 475 respondents, but this was filtered down to “current” Tech Workers which reduced down to 255 responses.</a:t>
             </a:r>
+          </a:p>
+          <a:p>
+            <a:endParaRPr lang="en-AU" dirty="0"/>
           </a:p>
           <a:p>
             <a:pPr marL="285750" indent="-285750">

</xml_diff>